<commit_message>
removing more references to old sample names
</commit_message>
<xml_diff>
--- a/LectureFiles/cshl/2014/RNASeq_Module4_Tutorial.pptx
+++ b/LectureFiles/cshl/2014/RNASeq_Module4_Tutorial.pptx
@@ -8061,11 +8061,39 @@
               </a:lnSpc>
             </a:pPr>
             <a:r>
-              <a:rPr lang="en-US" sz="2600">
-                <a:latin typeface="Calibri" charset="0"/>
-                <a:ea typeface="ＭＳ Ｐゴシック" charset="0"/>
-              </a:rPr>
-              <a:t>In this step we will use cuffmerge and cuffdiff to:</a:t>
+              <a:rPr lang="en-US" sz="2600" dirty="0">
+                <a:latin typeface="Calibri" charset="0"/>
+                <a:ea typeface="ＭＳ Ｐゴシック" charset="0"/>
+              </a:rPr>
+              <a:t>In this step we will use </a:t>
+            </a:r>
+            <a:r>
+              <a:rPr lang="en-US" sz="2600" dirty="0" err="1">
+                <a:latin typeface="Calibri" charset="0"/>
+                <a:ea typeface="ＭＳ Ｐゴシック" charset="0"/>
+              </a:rPr>
+              <a:t>cuffmerge</a:t>
+            </a:r>
+            <a:r>
+              <a:rPr lang="en-US" sz="2600" dirty="0">
+                <a:latin typeface="Calibri" charset="0"/>
+                <a:ea typeface="ＭＳ Ｐゴシック" charset="0"/>
+              </a:rPr>
+              <a:t> and </a:t>
+            </a:r>
+            <a:r>
+              <a:rPr lang="en-US" sz="2600" dirty="0" err="1">
+                <a:latin typeface="Calibri" charset="0"/>
+                <a:ea typeface="ＭＳ Ｐゴシック" charset="0"/>
+              </a:rPr>
+              <a:t>cuffdiff</a:t>
+            </a:r>
+            <a:r>
+              <a:rPr lang="en-US" sz="2600" dirty="0">
+                <a:latin typeface="Calibri" charset="0"/>
+                <a:ea typeface="ＭＳ Ｐゴシック" charset="0"/>
+              </a:rPr>
+              <a:t> to:</a:t>
             </a:r>
           </a:p>
           <a:p>
@@ -8075,11 +8103,25 @@
               </a:lnSpc>
             </a:pPr>
             <a:r>
-              <a:rPr lang="en-US" sz="2200">
-                <a:latin typeface="Calibri" charset="0"/>
-                <a:ea typeface="ＭＳ Ｐゴシック" charset="0"/>
-              </a:rPr>
-              <a:t>Combine expression estimates from our 4 libraries into more convenient files</a:t>
+              <a:rPr lang="en-US" sz="2200" dirty="0">
+                <a:latin typeface="Calibri" charset="0"/>
+                <a:ea typeface="ＭＳ Ｐゴシック" charset="0"/>
+              </a:rPr>
+              <a:t>Combine expression estimates from our </a:t>
+            </a:r>
+            <a:r>
+              <a:rPr lang="en-US" sz="2200" dirty="0" smtClean="0">
+                <a:latin typeface="Calibri" charset="0"/>
+                <a:ea typeface="ＭＳ Ｐゴシック" charset="0"/>
+              </a:rPr>
+              <a:t>6 </a:t>
+            </a:r>
+            <a:r>
+              <a:rPr lang="en-US" sz="2200" dirty="0">
+                <a:latin typeface="Calibri" charset="0"/>
+                <a:ea typeface="ＭＳ Ｐゴシック" charset="0"/>
+              </a:rPr>
+              <a:t>libraries into more convenient files</a:t>
             </a:r>
           </a:p>
           <a:p>
@@ -8089,7 +8131,7 @@
               </a:lnSpc>
             </a:pPr>
             <a:r>
-              <a:rPr lang="en-US" sz="2200">
+              <a:rPr lang="en-US" sz="2200" dirty="0">
                 <a:latin typeface="Calibri" charset="0"/>
                 <a:ea typeface="ＭＳ Ｐゴシック" charset="0"/>
               </a:rPr>
@@ -8103,11 +8145,39 @@
               </a:lnSpc>
             </a:pPr>
             <a:r>
-              <a:rPr lang="en-US" sz="2200">
-                <a:latin typeface="Calibri" charset="0"/>
-                <a:ea typeface="ＭＳ Ｐゴシック" charset="0"/>
-              </a:rPr>
-              <a:t>Compare tumor vs. normal and identify significantly differentially expressed genes and isoforms (transcripts)</a:t>
+              <a:rPr lang="en-US" sz="2200" dirty="0">
+                <a:latin typeface="Calibri" charset="0"/>
+                <a:ea typeface="ＭＳ Ｐゴシック" charset="0"/>
+              </a:rPr>
+              <a:t>Compare </a:t>
+            </a:r>
+            <a:r>
+              <a:rPr lang="en-US" sz="2200" dirty="0" smtClean="0">
+                <a:latin typeface="Calibri" charset="0"/>
+                <a:ea typeface="ＭＳ Ｐゴシック" charset="0"/>
+              </a:rPr>
+              <a:t>UHR vs</a:t>
+            </a:r>
+            <a:r>
+              <a:rPr lang="en-US" sz="2200" dirty="0">
+                <a:latin typeface="Calibri" charset="0"/>
+                <a:ea typeface="ＭＳ Ｐゴシック" charset="0"/>
+              </a:rPr>
+              <a:t>. </a:t>
+            </a:r>
+            <a:r>
+              <a:rPr lang="en-US" sz="2200" dirty="0" smtClean="0">
+                <a:latin typeface="Calibri" charset="0"/>
+                <a:ea typeface="ＭＳ Ｐゴシック" charset="0"/>
+              </a:rPr>
+              <a:t>HBR </a:t>
+            </a:r>
+            <a:r>
+              <a:rPr lang="en-US" sz="2200" dirty="0">
+                <a:latin typeface="Calibri" charset="0"/>
+                <a:ea typeface="ＭＳ Ｐゴシック" charset="0"/>
+              </a:rPr>
+              <a:t>and identify significantly differentially expressed genes and isoforms (transcripts)</a:t>
             </a:r>
           </a:p>
           <a:p>
@@ -8117,7 +8187,7 @@
               </a:lnSpc>
             </a:pPr>
             <a:r>
-              <a:rPr lang="en-US" sz="2600">
+              <a:rPr lang="en-US" sz="2600" dirty="0">
                 <a:latin typeface="Calibri" charset="0"/>
                 <a:ea typeface="ＭＳ Ｐゴシック" charset="0"/>
               </a:rPr>
@@ -8131,7 +8201,7 @@
               </a:lnSpc>
             </a:pPr>
             <a:r>
-              <a:rPr lang="en-US" sz="2200">
+              <a:rPr lang="en-US" sz="2200" dirty="0">
                 <a:latin typeface="Calibri" charset="0"/>
                 <a:ea typeface="ＭＳ Ｐゴシック" charset="0"/>
               </a:rPr>
@@ -8145,7 +8215,7 @@
               </a:lnSpc>
             </a:pPr>
             <a:r>
-              <a:rPr lang="en-US" sz="2600">
+              <a:rPr lang="en-US" sz="2600" dirty="0">
                 <a:latin typeface="Calibri" charset="0"/>
                 <a:ea typeface="ＭＳ Ｐゴシック" charset="0"/>
               </a:rPr>
@@ -8159,11 +8229,39 @@
               </a:lnSpc>
             </a:pPr>
             <a:r>
-              <a:rPr lang="en-US" sz="1800">
-                <a:latin typeface="Calibri" charset="0"/>
-                <a:ea typeface="ＭＳ Ｐゴシック" charset="0"/>
-              </a:rPr>
-              <a:t>Compare Tumor vs. Normal using all replicates, for known (reference only mode) transcripts</a:t>
+              <a:rPr lang="en-US" sz="1800" dirty="0">
+                <a:latin typeface="Calibri" charset="0"/>
+                <a:ea typeface="ＭＳ Ｐゴシック" charset="0"/>
+              </a:rPr>
+              <a:t>Compare </a:t>
+            </a:r>
+            <a:r>
+              <a:rPr lang="en-US" sz="1800" dirty="0" smtClean="0">
+                <a:latin typeface="Calibri" charset="0"/>
+                <a:ea typeface="ＭＳ Ｐゴシック" charset="0"/>
+              </a:rPr>
+              <a:t>UHR vs</a:t>
+            </a:r>
+            <a:r>
+              <a:rPr lang="en-US" sz="1800" dirty="0">
+                <a:latin typeface="Calibri" charset="0"/>
+                <a:ea typeface="ＭＳ Ｐゴシック" charset="0"/>
+              </a:rPr>
+              <a:t>. </a:t>
+            </a:r>
+            <a:r>
+              <a:rPr lang="en-US" sz="1800" dirty="0" smtClean="0">
+                <a:latin typeface="Calibri" charset="0"/>
+                <a:ea typeface="ＭＳ Ｐゴシック" charset="0"/>
+              </a:rPr>
+              <a:t>HBR </a:t>
+            </a:r>
+            <a:r>
+              <a:rPr lang="en-US" sz="1800" dirty="0">
+                <a:latin typeface="Calibri" charset="0"/>
+                <a:ea typeface="ＭＳ Ｐゴシック" charset="0"/>
+              </a:rPr>
+              <a:t>using all replicates, for known (reference only mode) transcripts</a:t>
             </a:r>
           </a:p>
         </p:txBody>

</xml_diff>